<commit_message>
Select profile, increase font size in PPTX
</commit_message>
<xml_diff>
--- a/Api/Templates/Awards Ceremony.pptx
+++ b/Api/Templates/Awards Ceremony.pptx
@@ -9735,7 +9735,7 @@
           </a:bodyPr>
           <a:lstStyle/>
           <a:p>
-            <a:pPr marL="0" lvl="0" indent="0" algn="l" rtl="0">
+            <a:pPr marL="0" lvl="0" indent="0" algn="ctr" rtl="0">
               <a:lnSpc>
                 <a:spcPct val="100000"/>
               </a:lnSpc>
@@ -9753,14 +9753,14 @@
               <a:buNone/>
             </a:pPr>
             <a:r>
-              <a:rPr lang="en-US" dirty="0"/>
+              <a:rPr lang="en-US" sz="3600" b="1" dirty="0"/>
               <a:t>{</a:t>
             </a:r>
             <a:r>
-              <a:rPr lang="en" dirty="0"/>
+              <a:rPr lang="en" sz="3600" b="1" dirty="0"/>
               <a:t>Coach/Mentor Award}</a:t>
             </a:r>
-            <a:endParaRPr dirty="0"/>
+            <a:endParaRPr sz="3600" b="1" dirty="0"/>
           </a:p>
         </p:txBody>
       </p:sp>
@@ -10084,7 +10084,7 @@
           </a:bodyPr>
           <a:lstStyle/>
           <a:p>
-            <a:pPr marL="0" lvl="0" indent="0" algn="l" rtl="0">
+            <a:pPr marL="0" lvl="0" indent="0" algn="ctr" rtl="0">
               <a:lnSpc>
                 <a:spcPct val="100000"/>
               </a:lnSpc>
@@ -10102,14 +10102,14 @@
               <a:buNone/>
             </a:pPr>
             <a:r>
-              <a:rPr lang="en-US" dirty="0"/>
+              <a:rPr lang="en-US" sz="3600" b="1" dirty="0"/>
               <a:t>{</a:t>
             </a:r>
             <a:r>
-              <a:rPr lang="en" dirty="0"/>
+              <a:rPr lang="en" sz="3600" b="1" dirty="0"/>
               <a:t>Core Values Award}</a:t>
             </a:r>
-            <a:endParaRPr dirty="0"/>
+            <a:endParaRPr sz="3600" b="1" dirty="0"/>
           </a:p>
         </p:txBody>
       </p:sp>
@@ -10433,7 +10433,7 @@
           </a:bodyPr>
           <a:lstStyle/>
           <a:p>
-            <a:pPr marL="0" lvl="0" indent="0" algn="l" rtl="0">
+            <a:pPr marL="0" lvl="0" indent="0" algn="ctr" rtl="0">
               <a:lnSpc>
                 <a:spcPct val="100000"/>
               </a:lnSpc>
@@ -10451,14 +10451,14 @@
               <a:buNone/>
             </a:pPr>
             <a:r>
-              <a:rPr lang="en-US" dirty="0"/>
+              <a:rPr lang="en-US" sz="3600" b="1" dirty="0"/>
               <a:t>{</a:t>
             </a:r>
             <a:r>
-              <a:rPr lang="en" dirty="0"/>
+              <a:rPr lang="en" sz="3600" b="1" dirty="0"/>
               <a:t>Innovation Project Award}</a:t>
             </a:r>
-            <a:endParaRPr dirty="0"/>
+            <a:endParaRPr sz="3600" b="1" dirty="0"/>
           </a:p>
         </p:txBody>
       </p:sp>
@@ -10872,7 +10872,7 @@
           </a:bodyPr>
           <a:lstStyle/>
           <a:p>
-            <a:pPr marL="0" lvl="0" indent="0" algn="l" rtl="0">
+            <a:pPr marL="0" lvl="0" indent="0" algn="ctr" rtl="0">
               <a:lnSpc>
                 <a:spcPct val="100000"/>
               </a:lnSpc>
@@ -10890,14 +10890,14 @@
               <a:buNone/>
             </a:pPr>
             <a:r>
-              <a:rPr lang="en-US" dirty="0"/>
+              <a:rPr lang="en-US" sz="3600" b="1" dirty="0"/>
               <a:t>{</a:t>
             </a:r>
             <a:r>
-              <a:rPr lang="en" dirty="0"/>
+              <a:rPr lang="en" sz="3600" b="1" dirty="0"/>
               <a:t>Robot Design Award}</a:t>
             </a:r>
-            <a:endParaRPr dirty="0"/>
+            <a:endParaRPr sz="3600" b="1" dirty="0"/>
           </a:p>
         </p:txBody>
       </p:sp>
@@ -11221,7 +11221,7 @@
           </a:bodyPr>
           <a:lstStyle/>
           <a:p>
-            <a:pPr marL="0" lvl="0" indent="0" algn="l" rtl="0">
+            <a:pPr marL="0" lvl="0" indent="0" rtl="0">
               <a:lnSpc>
                 <a:spcPct val="100000"/>
               </a:lnSpc>
@@ -11240,9 +11240,32 @@
             </a:pPr>
             <a:r>
               <a:rPr lang="en" dirty="0"/>
-              <a:t>Team: {Robot Performance Award}</a:t>
+              <a:t>Team:</a:t>
             </a:r>
-            <a:endParaRPr dirty="0"/>
+          </a:p>
+          <a:p>
+            <a:pPr marL="0" lvl="0" indent="0" algn="ctr" rtl="0">
+              <a:lnSpc>
+                <a:spcPct val="100000"/>
+              </a:lnSpc>
+              <a:spcBef>
+                <a:spcPts val="0"/>
+              </a:spcBef>
+              <a:spcAft>
+                <a:spcPts val="0"/>
+              </a:spcAft>
+              <a:buClr>
+                <a:srgbClr val="000000"/>
+              </a:buClr>
+              <a:buSzPts val="2000"/>
+              <a:buFont typeface="Roboto"/>
+              <a:buNone/>
+            </a:pPr>
+            <a:r>
+              <a:rPr lang="en" sz="3600" b="1" dirty="0"/>
+              <a:t>{Robot Performance Award}</a:t>
+            </a:r>
+            <a:endParaRPr sz="3600" b="1" dirty="0"/>
           </a:p>
           <a:p>
             <a:pPr marL="0" lvl="0" indent="0" algn="l" rtl="0">
@@ -11284,9 +11307,32 @@
             </a:pPr>
             <a:r>
               <a:rPr lang="en" dirty="0"/>
-              <a:t>High Score: {Robot Performance Score}</a:t>
+              <a:t>High Score:</a:t>
             </a:r>
-            <a:endParaRPr dirty="0"/>
+          </a:p>
+          <a:p>
+            <a:pPr marL="0" lvl="0" indent="0" algn="ctr" rtl="0">
+              <a:lnSpc>
+                <a:spcPct val="100000"/>
+              </a:lnSpc>
+              <a:spcBef>
+                <a:spcPts val="600"/>
+              </a:spcBef>
+              <a:spcAft>
+                <a:spcPts val="0"/>
+              </a:spcAft>
+              <a:buClr>
+                <a:srgbClr val="000000"/>
+              </a:buClr>
+              <a:buSzPts val="2000"/>
+              <a:buFont typeface="Roboto"/>
+              <a:buNone/>
+            </a:pPr>
+            <a:r>
+              <a:rPr lang="en" sz="3600" b="1" dirty="0"/>
+              <a:t>{Robot Performance Score}</a:t>
+            </a:r>
+            <a:endParaRPr sz="3600" b="1" dirty="0"/>
           </a:p>
         </p:txBody>
       </p:sp>
@@ -11610,7 +11656,7 @@
           </a:bodyPr>
           <a:lstStyle/>
           <a:p>
-            <a:pPr marL="0" lvl="0" indent="0" algn="l" rtl="0">
+            <a:pPr marL="0" lvl="0" indent="0" algn="ctr" rtl="0">
               <a:lnSpc>
                 <a:spcPct val="100000"/>
               </a:lnSpc>
@@ -11628,14 +11674,14 @@
               <a:buNone/>
             </a:pPr>
             <a:r>
-              <a:rPr lang="en-US" dirty="0"/>
+              <a:rPr lang="en-US" sz="3600" b="1" dirty="0"/>
               <a:t>{</a:t>
             </a:r>
             <a:r>
-              <a:rPr lang="en" dirty="0"/>
+              <a:rPr lang="en" sz="3600" b="1" dirty="0"/>
               <a:t>Breakthrough Award}</a:t>
             </a:r>
-            <a:endParaRPr dirty="0"/>
+            <a:endParaRPr sz="3600" b="1" dirty="0"/>
           </a:p>
         </p:txBody>
       </p:sp>
@@ -12046,7 +12092,7 @@
           </a:bodyPr>
           <a:lstStyle/>
           <a:p>
-            <a:pPr marL="0" lvl="0" indent="0" algn="l" rtl="0">
+            <a:pPr marL="0" lvl="0" indent="0" algn="ctr" rtl="0">
               <a:lnSpc>
                 <a:spcPct val="100000"/>
               </a:lnSpc>
@@ -12064,14 +12110,14 @@
               <a:buNone/>
             </a:pPr>
             <a:r>
-              <a:rPr lang="en-US" dirty="0"/>
+              <a:rPr lang="en-US" sz="3600" b="1" dirty="0"/>
               <a:t>{</a:t>
             </a:r>
             <a:r>
-              <a:rPr lang="en" dirty="0"/>
+              <a:rPr lang="en" sz="3600" b="1" dirty="0"/>
               <a:t>Engineering Excellence Award}</a:t>
             </a:r>
-            <a:endParaRPr dirty="0"/>
+            <a:endParaRPr sz="3600" b="1" dirty="0"/>
           </a:p>
         </p:txBody>
       </p:sp>
@@ -12395,7 +12441,7 @@
           </a:bodyPr>
           <a:lstStyle/>
           <a:p>
-            <a:pPr marL="0" lvl="0" indent="0" algn="l" rtl="0">
+            <a:pPr marL="0" lvl="0" indent="0" algn="ctr" rtl="0">
               <a:lnSpc>
                 <a:spcPct val="100000"/>
               </a:lnSpc>
@@ -12413,14 +12459,14 @@
               <a:buNone/>
             </a:pPr>
             <a:r>
-              <a:rPr lang="en-US" dirty="0"/>
+              <a:rPr lang="en-US" sz="3600" b="1" dirty="0"/>
               <a:t>{</a:t>
             </a:r>
             <a:r>
-              <a:rPr lang="en" dirty="0"/>
+              <a:rPr lang="en" sz="3600" b="1" dirty="0"/>
               <a:t>Rising All-Star Award}</a:t>
             </a:r>
-            <a:endParaRPr dirty="0"/>
+            <a:endParaRPr sz="3600" b="1" dirty="0"/>
           </a:p>
         </p:txBody>
       </p:sp>
@@ -12752,7 +12798,7 @@
           </a:bodyPr>
           <a:lstStyle/>
           <a:p>
-            <a:pPr marL="0" lvl="0" indent="0" algn="l" rtl="0">
+            <a:pPr marL="0" lvl="0" indent="0" algn="ctr" rtl="0">
               <a:lnSpc>
                 <a:spcPct val="100000"/>
               </a:lnSpc>
@@ -12770,14 +12816,14 @@
               <a:buNone/>
             </a:pPr>
             <a:r>
-              <a:rPr lang="en-US" dirty="0"/>
+              <a:rPr lang="en-US" sz="3600" b="1" dirty="0"/>
               <a:t>{</a:t>
             </a:r>
             <a:r>
-              <a:rPr lang="en" dirty="0"/>
+              <a:rPr lang="en" sz="3600" b="1" dirty="0"/>
               <a:t>Motivate Award}</a:t>
             </a:r>
-            <a:endParaRPr dirty="0"/>
+            <a:endParaRPr sz="3600" b="1" dirty="0"/>
           </a:p>
         </p:txBody>
       </p:sp>
@@ -13117,7 +13163,7 @@
           </a:bodyPr>
           <a:lstStyle/>
           <a:p>
-            <a:pPr marL="0" lvl="0" indent="0" algn="l" rtl="0">
+            <a:pPr marL="0" lvl="0" indent="0" algn="ctr" rtl="0">
               <a:lnSpc>
                 <a:spcPct val="100000"/>
               </a:lnSpc>
@@ -13135,14 +13181,14 @@
               <a:buNone/>
             </a:pPr>
             <a:r>
-              <a:rPr lang="en-US" dirty="0"/>
+              <a:rPr lang="en-US" sz="3600" b="1" dirty="0"/>
               <a:t>{</a:t>
             </a:r>
             <a:r>
-              <a:rPr lang="en" dirty="0"/>
+              <a:rPr lang="en" sz="3600" b="1" dirty="0"/>
               <a:t>Champion’s Award}</a:t>
             </a:r>
-            <a:endParaRPr dirty="0"/>
+            <a:endParaRPr sz="3600" b="1" dirty="0"/>
           </a:p>
         </p:txBody>
       </p:sp>
@@ -13357,7 +13403,7 @@
         </p:spPr>
         <p:txBody>
           <a:bodyPr spcFirstLastPara="1" wrap="square" lIns="45700" tIns="45700" rIns="45700" bIns="45700" anchor="t" anchorCtr="0">
-            <a:normAutofit/>
+            <a:normAutofit fontScale="70000" lnSpcReduction="20000"/>
           </a:bodyPr>
           <a:lstStyle/>
           <a:p>
@@ -13388,7 +13434,7 @@
             </a:r>
           </a:p>
           <a:p>
-            <a:pPr marL="0" lvl="0" indent="0" algn="l" rtl="0">
+            <a:pPr marL="0" lvl="0" indent="0" algn="ctr" rtl="0">
               <a:lnSpc>
                 <a:spcPct val="100000"/>
               </a:lnSpc>
@@ -13406,79 +13452,79 @@
               <a:buNone/>
             </a:pPr>
             <a:r>
-              <a:rPr lang="en" dirty="0"/>
+              <a:rPr lang="en" sz="4100" b="1" dirty="0"/>
               <a:t>{Advancing Team 1}</a:t>
             </a:r>
           </a:p>
           <a:p>
-            <a:pPr marL="0" indent="0">
+            <a:pPr marL="0" indent="0" algn="ctr">
               <a:spcBef>
                 <a:spcPts val="0"/>
               </a:spcBef>
               <a:buSzPts val="2000"/>
             </a:pPr>
             <a:r>
-              <a:rPr lang="en-US" dirty="0"/>
+              <a:rPr lang="en-US" sz="4100" b="1" dirty="0"/>
               <a:t>{Advancing Team 2}</a:t>
             </a:r>
           </a:p>
           <a:p>
-            <a:pPr marL="0" indent="0">
+            <a:pPr marL="0" indent="0" algn="ctr">
               <a:spcBef>
                 <a:spcPts val="0"/>
               </a:spcBef>
               <a:buSzPts val="2000"/>
             </a:pPr>
             <a:r>
-              <a:rPr lang="en-US" dirty="0"/>
+              <a:rPr lang="en-US" sz="4100" b="1" dirty="0"/>
               <a:t>{Advancing Team 3}</a:t>
             </a:r>
           </a:p>
           <a:p>
-            <a:pPr marL="0" indent="0">
+            <a:pPr marL="0" indent="0" algn="ctr">
               <a:spcBef>
                 <a:spcPts val="0"/>
               </a:spcBef>
               <a:buSzPts val="2000"/>
             </a:pPr>
             <a:r>
-              <a:rPr lang="en-US" dirty="0"/>
+              <a:rPr lang="en-US" sz="4100" b="1" dirty="0"/>
               <a:t>{Advancing Team 4}</a:t>
             </a:r>
           </a:p>
           <a:p>
-            <a:pPr marL="0" indent="0">
+            <a:pPr marL="0" indent="0" algn="ctr">
               <a:spcBef>
                 <a:spcPts val="0"/>
               </a:spcBef>
               <a:buSzPts val="2000"/>
             </a:pPr>
             <a:r>
-              <a:rPr lang="en-US" dirty="0"/>
+              <a:rPr lang="en-US" sz="4100" b="1" dirty="0"/>
               <a:t>{Advancing Team 5}</a:t>
             </a:r>
           </a:p>
           <a:p>
-            <a:pPr marL="0" indent="0">
+            <a:pPr marL="0" indent="0" algn="ctr">
               <a:spcBef>
                 <a:spcPts val="0"/>
               </a:spcBef>
               <a:buSzPts val="2000"/>
             </a:pPr>
             <a:r>
-              <a:rPr lang="en-US" dirty="0"/>
+              <a:rPr lang="en-US" sz="4100" b="1" dirty="0"/>
               <a:t>{Advancing Team 6}</a:t>
             </a:r>
           </a:p>
           <a:p>
-            <a:pPr marL="0" indent="0">
+            <a:pPr marL="0" indent="0" algn="ctr">
               <a:spcBef>
                 <a:spcPts val="0"/>
               </a:spcBef>
               <a:buSzPts val="2000"/>
             </a:pPr>
             <a:r>
-              <a:rPr lang="en-US" dirty="0"/>
+              <a:rPr lang="en-US" sz="4100" b="1" dirty="0"/>
               <a:t>{Advancing Team 7}</a:t>
             </a:r>
           </a:p>
@@ -14335,7 +14381,7 @@
           </a:bodyPr>
           <a:lstStyle/>
           <a:p>
-            <a:pPr marL="0" lvl="0" indent="0" algn="l" rtl="0">
+            <a:pPr marL="0" lvl="0" indent="0" algn="ctr" rtl="0">
               <a:lnSpc>
                 <a:spcPct val="100000"/>
               </a:lnSpc>
@@ -14353,10 +14399,10 @@
               <a:buNone/>
             </a:pPr>
             <a:r>
-              <a:rPr lang="en-US" dirty="0"/>
+              <a:rPr lang="en-US" sz="3600" b="1" dirty="0"/>
               <a:t>{Volunteer Award}</a:t>
             </a:r>
-            <a:endParaRPr dirty="0"/>
+            <a:endParaRPr sz="3600" b="1" dirty="0"/>
           </a:p>
         </p:txBody>
       </p:sp>

</xml_diff>